<commit_message>
Started DoorstroomData (not finished)
</commit_message>
<xml_diff>
--- a/CalculationDomain/ErasmusHogeSchool/EmptyPowerPoint.pptx
+++ b/CalculationDomain/ErasmusHogeSchool/EmptyPowerPoint.pptx
@@ -2358,7 +2358,7 @@
           <a:p>
             <a:fld id="{55ACFCA9-EE0F-409A-A8C3-56F056561412}" type="datetimeFigureOut">
               <a:rPr lang="nl-BE" smtClean="0"/>
-              <a:t>22/01/2020</a:t>
+              <a:t>15/02/2020</a:t>
             </a:fld>
             <a:endParaRPr lang="nl-BE"/>
           </a:p>
@@ -3983,7 +3983,7 @@
           <a:p>
             <a:fld id="{4E928996-A761-48F5-904A-3D23874764CB}" type="datetimeFigureOut">
               <a:rPr lang="nl-BE" smtClean="0"/>
-              <a:t>22/01/2020</a:t>
+              <a:t>15/02/2020</a:t>
             </a:fld>
             <a:endParaRPr lang="nl-BE"/>
           </a:p>
@@ -4153,7 +4153,7 @@
           <a:p>
             <a:fld id="{4E928996-A761-48F5-904A-3D23874764CB}" type="datetimeFigureOut">
               <a:rPr lang="nl-BE" smtClean="0"/>
-              <a:t>22/01/2020</a:t>
+              <a:t>15/02/2020</a:t>
             </a:fld>
             <a:endParaRPr lang="nl-BE"/>
           </a:p>
@@ -4333,7 +4333,7 @@
           <a:p>
             <a:fld id="{4E928996-A761-48F5-904A-3D23874764CB}" type="datetimeFigureOut">
               <a:rPr lang="nl-BE" smtClean="0"/>
-              <a:t>22/01/2020</a:t>
+              <a:t>15/02/2020</a:t>
             </a:fld>
             <a:endParaRPr lang="nl-BE"/>
           </a:p>
@@ -5490,7 +5490,7 @@
                 </a:solidFill>
               </a:rPr>
               <a:pPr/>
-              <a:t>22/01/2020</a:t>
+              <a:t>15/02/2020</a:t>
             </a:fld>
             <a:endParaRPr lang="nl-BE">
               <a:solidFill>
@@ -5693,7 +5693,7 @@
           <a:p>
             <a:fld id="{4E928996-A761-48F5-904A-3D23874764CB}" type="datetimeFigureOut">
               <a:rPr lang="nl-BE" smtClean="0"/>
-              <a:t>22/01/2020</a:t>
+              <a:t>15/02/2020</a:t>
             </a:fld>
             <a:endParaRPr lang="nl-BE"/>
           </a:p>
@@ -5939,7 +5939,7 @@
           <a:p>
             <a:fld id="{4E928996-A761-48F5-904A-3D23874764CB}" type="datetimeFigureOut">
               <a:rPr lang="nl-BE" smtClean="0"/>
-              <a:t>22/01/2020</a:t>
+              <a:t>15/02/2020</a:t>
             </a:fld>
             <a:endParaRPr lang="nl-BE"/>
           </a:p>
@@ -6227,7 +6227,7 @@
           <a:p>
             <a:fld id="{4E928996-A761-48F5-904A-3D23874764CB}" type="datetimeFigureOut">
               <a:rPr lang="nl-BE" smtClean="0"/>
-              <a:t>22/01/2020</a:t>
+              <a:t>15/02/2020</a:t>
             </a:fld>
             <a:endParaRPr lang="nl-BE"/>
           </a:p>
@@ -6649,7 +6649,7 @@
           <a:p>
             <a:fld id="{4E928996-A761-48F5-904A-3D23874764CB}" type="datetimeFigureOut">
               <a:rPr lang="nl-BE" smtClean="0"/>
-              <a:t>22/01/2020</a:t>
+              <a:t>15/02/2020</a:t>
             </a:fld>
             <a:endParaRPr lang="nl-BE"/>
           </a:p>
@@ -6767,7 +6767,7 @@
           <a:p>
             <a:fld id="{4E928996-A761-48F5-904A-3D23874764CB}" type="datetimeFigureOut">
               <a:rPr lang="nl-BE" smtClean="0"/>
-              <a:t>22/01/2020</a:t>
+              <a:t>15/02/2020</a:t>
             </a:fld>
             <a:endParaRPr lang="nl-BE"/>
           </a:p>
@@ -6862,7 +6862,7 @@
           <a:p>
             <a:fld id="{4E928996-A761-48F5-904A-3D23874764CB}" type="datetimeFigureOut">
               <a:rPr lang="nl-BE" smtClean="0"/>
-              <a:t>22/01/2020</a:t>
+              <a:t>15/02/2020</a:t>
             </a:fld>
             <a:endParaRPr lang="nl-BE"/>
           </a:p>
@@ -7139,7 +7139,7 @@
           <a:p>
             <a:fld id="{4E928996-A761-48F5-904A-3D23874764CB}" type="datetimeFigureOut">
               <a:rPr lang="nl-BE" smtClean="0"/>
-              <a:t>22/01/2020</a:t>
+              <a:t>15/02/2020</a:t>
             </a:fld>
             <a:endParaRPr lang="nl-BE"/>
           </a:p>
@@ -7392,7 +7392,7 @@
           <a:p>
             <a:fld id="{4E928996-A761-48F5-904A-3D23874764CB}" type="datetimeFigureOut">
               <a:rPr lang="nl-BE" smtClean="0"/>
-              <a:t>22/01/2020</a:t>
+              <a:t>15/02/2020</a:t>
             </a:fld>
             <a:endParaRPr lang="nl-BE"/>
           </a:p>
@@ -7605,7 +7605,7 @@
           <a:p>
             <a:fld id="{4E928996-A761-48F5-904A-3D23874764CB}" type="datetimeFigureOut">
               <a:rPr lang="nl-BE" smtClean="0"/>
-              <a:t>22/01/2020</a:t>
+              <a:t>15/02/2020</a:t>
             </a:fld>
             <a:endParaRPr lang="nl-BE"/>
           </a:p>
@@ -9702,14 +9702,14 @@
           <p:nvPr>
             <p:extLst>
               <p:ext uri="{D42A27DB-BD31-4B8C-83A1-F6EECF244321}">
-                <p14:modId xmlns:p14="http://schemas.microsoft.com/office/powerpoint/2010/main" val="150571693"/>
+                <p14:modId xmlns:p14="http://schemas.microsoft.com/office/powerpoint/2010/main" val="759106393"/>
               </p:ext>
             </p:extLst>
           </p:nvPr>
         </p:nvGraphicFramePr>
         <p:xfrm>
           <a:off x="157479" y="4126045"/>
-          <a:ext cx="5525449" cy="2011680"/>
+          <a:ext cx="6941505" cy="2011680"/>
         </p:xfrm>
         <a:graphic>
           <a:graphicData uri="http://schemas.openxmlformats.org/drawingml/2006/table">
@@ -9718,42 +9718,42 @@
                 <a:tableStyleId>{5C22544A-7EE6-4342-B048-85BDC9FD1C3A}</a:tableStyleId>
               </a:tblPr>
               <a:tblGrid>
-                <a:gridCol w="1107619">
+                <a:gridCol w="1391479">
                   <a:extLst>
                     <a:ext uri="{9D8B030D-6E8A-4147-A177-3AD203B41FA5}">
                       <a16:colId xmlns:a16="http://schemas.microsoft.com/office/drawing/2014/main" val="20000"/>
                     </a:ext>
                   </a:extLst>
                 </a:gridCol>
-                <a:gridCol w="883566">
+                <a:gridCol w="1150834">
                   <a:extLst>
                     <a:ext uri="{9D8B030D-6E8A-4147-A177-3AD203B41FA5}">
                       <a16:colId xmlns:a16="http://schemas.microsoft.com/office/drawing/2014/main" val="704123152"/>
                     </a:ext>
                   </a:extLst>
                 </a:gridCol>
-                <a:gridCol w="883566">
+                <a:gridCol w="1152128">
                   <a:extLst>
                     <a:ext uri="{9D8B030D-6E8A-4147-A177-3AD203B41FA5}">
                       <a16:colId xmlns:a16="http://schemas.microsoft.com/office/drawing/2014/main" val="3370480986"/>
                     </a:ext>
                   </a:extLst>
                 </a:gridCol>
-                <a:gridCol w="883566">
+                <a:gridCol w="1008112">
                   <a:extLst>
                     <a:ext uri="{9D8B030D-6E8A-4147-A177-3AD203B41FA5}">
                       <a16:colId xmlns:a16="http://schemas.microsoft.com/office/drawing/2014/main" val="1622719347"/>
                     </a:ext>
                   </a:extLst>
                 </a:gridCol>
-                <a:gridCol w="883566">
+                <a:gridCol w="1152128">
                   <a:extLst>
                     <a:ext uri="{9D8B030D-6E8A-4147-A177-3AD203B41FA5}">
                       <a16:colId xmlns:a16="http://schemas.microsoft.com/office/drawing/2014/main" val="2871820729"/>
                     </a:ext>
                   </a:extLst>
                 </a:gridCol>
-                <a:gridCol w="883566">
+                <a:gridCol w="1086824">
                   <a:extLst>
                     <a:ext uri="{9D8B030D-6E8A-4147-A177-3AD203B41FA5}">
                       <a16:colId xmlns:a16="http://schemas.microsoft.com/office/drawing/2014/main" val="3188822285"/>
@@ -10145,7 +10145,7 @@
         </p:nvSpPr>
         <p:spPr>
           <a:xfrm>
-            <a:off x="2045016" y="4888998"/>
+            <a:off x="2442176" y="4915025"/>
             <a:ext cx="583778" cy="369332"/>
           </a:xfrm>
           <a:prstGeom prst="rect">
@@ -10180,7 +10180,7 @@
         </p:nvSpPr>
         <p:spPr>
           <a:xfrm>
-            <a:off x="1935263" y="4820057"/>
+            <a:off x="2332423" y="4846084"/>
             <a:ext cx="192544" cy="823327"/>
           </a:xfrm>
           <a:prstGeom prst="rightBrace">
@@ -10271,7 +10271,7 @@
         <p:spPr>
           <a:xfrm>
             <a:off x="0" y="6113360"/>
-            <a:ext cx="8473820" cy="646331"/>
+            <a:ext cx="8473820" cy="369332"/>
           </a:xfrm>
           <a:prstGeom prst="rect">
             <a:avLst/>
@@ -10296,21 +10296,7 @@
             </a:r>
             <a:r>
               <a:rPr lang="nl-BE" dirty="0"/>
-              <a:t>Berekend t.o.v. de voltijdse nieuwe studenten, gemeten einde academiejaar</a:t>
-            </a:r>
-          </a:p>
-          <a:p>
-            <a:r>
-              <a:rPr lang="nl-BE" dirty="0"/>
-              <a:t>  (30 studenten). Dit aantal ligt lager dan de meting begin</a:t>
-            </a:r>
-            <a:r>
-              <a:rPr lang="nl-BE" b="1" dirty="0"/>
-              <a:t> </a:t>
-            </a:r>
-            <a:r>
-              <a:rPr lang="nl-BE" dirty="0"/>
-              <a:t>academiejaar (51 studenten). </a:t>
+              <a:t>Berekend t.o.v. de voltijdse nieuwe studenten, gemeten einde academiejaar.</a:t>
             </a:r>
           </a:p>
         </p:txBody>
@@ -10323,7 +10309,7 @@
         </p:nvSpPr>
         <p:spPr>
           <a:xfrm>
-            <a:off x="3812513" y="4831453"/>
+            <a:off x="4693797" y="4857480"/>
             <a:ext cx="96272" cy="807612"/>
           </a:xfrm>
           <a:prstGeom prst="rightBrace">
@@ -10368,7 +10354,7 @@
         </p:nvSpPr>
         <p:spPr>
           <a:xfrm>
-            <a:off x="3924146" y="4888998"/>
+            <a:off x="4805430" y="4915025"/>
             <a:ext cx="583778" cy="369332"/>
           </a:xfrm>
           <a:prstGeom prst="rect">
@@ -10431,7 +10417,7 @@
         </p:nvSpPr>
         <p:spPr>
           <a:xfrm>
-            <a:off x="3063507" y="4888998"/>
+            <a:off x="3546018" y="4918564"/>
             <a:ext cx="583778" cy="369332"/>
           </a:xfrm>
           <a:prstGeom prst="rect">
@@ -10466,7 +10452,7 @@
         </p:nvSpPr>
         <p:spPr>
           <a:xfrm>
-            <a:off x="2951281" y="4827914"/>
+            <a:off x="3433792" y="4857480"/>
             <a:ext cx="96272" cy="807612"/>
           </a:xfrm>
           <a:prstGeom prst="rightBrace">
@@ -11484,7 +11470,7 @@
         </p:nvSpPr>
         <p:spPr>
           <a:xfrm>
-            <a:off x="4697217" y="4831453"/>
+            <a:off x="5630134" y="4857480"/>
             <a:ext cx="96272" cy="807612"/>
           </a:xfrm>
           <a:prstGeom prst="rightBrace">
@@ -11535,7 +11521,7 @@
         </p:nvSpPr>
         <p:spPr>
           <a:xfrm>
-            <a:off x="4808850" y="4888998"/>
+            <a:off x="5741767" y="4915025"/>
             <a:ext cx="583778" cy="369332"/>
           </a:xfrm>
           <a:prstGeom prst="rect">
@@ -11576,7 +11562,7 @@
         </p:nvSpPr>
         <p:spPr>
           <a:xfrm>
-            <a:off x="5528652" y="4822082"/>
+            <a:off x="6890139" y="4857480"/>
             <a:ext cx="96272" cy="807612"/>
           </a:xfrm>
           <a:prstGeom prst="rightBrace">
@@ -11627,7 +11613,7 @@
         </p:nvSpPr>
         <p:spPr>
           <a:xfrm>
-            <a:off x="5640285" y="4879627"/>
+            <a:off x="7001772" y="4915025"/>
             <a:ext cx="583778" cy="369332"/>
           </a:xfrm>
           <a:prstGeom prst="rect">

</xml_diff>

<commit_message>
Studieduur slides bijna klaar
</commit_message>
<xml_diff>
--- a/CalculationDomain/ErasmusHogeSchool/EmptyPowerPoint.pptx
+++ b/CalculationDomain/ErasmusHogeSchool/EmptyPowerPoint.pptx
@@ -158,7 +158,7 @@
 <file path=ppt/charts/chart1.xml><?xml version="1.0" encoding="utf-8"?>
 <c:chartSpace xmlns:c="http://schemas.openxmlformats.org/drawingml/2006/chart" xmlns:a="http://schemas.openxmlformats.org/drawingml/2006/main" xmlns:r="http://schemas.openxmlformats.org/officeDocument/2006/relationships" xmlns:c16r2="http://schemas.microsoft.com/office/drawing/2015/06/chart">
   <c:date1904 val="0"/>
-  <c:lang val="en-US"/>
+  <c:lang val="nl-NL"/>
   <c:roundedCorners val="0"/>
   <mc:AlternateContent xmlns:mc="http://schemas.openxmlformats.org/markup-compatibility/2006">
     <mc:Choice xmlns:c14="http://schemas.microsoft.com/office/drawing/2007/8/2/chart" Requires="c14">
@@ -574,7 +574,7 @@
 <file path=ppt/charts/chart2.xml><?xml version="1.0" encoding="utf-8"?>
 <c:chartSpace xmlns:c="http://schemas.openxmlformats.org/drawingml/2006/chart" xmlns:a="http://schemas.openxmlformats.org/drawingml/2006/main" xmlns:r="http://schemas.openxmlformats.org/officeDocument/2006/relationships" xmlns:c16r2="http://schemas.microsoft.com/office/drawing/2015/06/chart">
   <c:date1904 val="0"/>
-  <c:lang val="en-US"/>
+  <c:lang val="nl-NL"/>
   <c:roundedCorners val="0"/>
   <mc:AlternateContent xmlns:mc="http://schemas.openxmlformats.org/markup-compatibility/2006">
     <mc:Choice xmlns:c14="http://schemas.microsoft.com/office/drawing/2007/8/2/chart" Requires="c14">
@@ -2358,7 +2358,7 @@
           <a:p>
             <a:fld id="{55ACFCA9-EE0F-409A-A8C3-56F056561412}" type="datetimeFigureOut">
               <a:rPr lang="nl-BE" smtClean="0"/>
-              <a:t>15/02/2020</a:t>
+              <a:t>20/05/2020</a:t>
             </a:fld>
             <a:endParaRPr lang="nl-BE"/>
           </a:p>
@@ -2517,7 +2517,7 @@
           <a:p>
             <a:fld id="{EC40B2C6-99A6-46E5-A4FE-A0208B410262}" type="slidenum">
               <a:rPr lang="nl-BE" smtClean="0"/>
-              <a:t>‹#›</a:t>
+              <a:t>‹nr.›</a:t>
             </a:fld>
             <a:endParaRPr lang="nl-BE"/>
           </a:p>
@@ -3983,7 +3983,7 @@
           <a:p>
             <a:fld id="{4E928996-A761-48F5-904A-3D23874764CB}" type="datetimeFigureOut">
               <a:rPr lang="nl-BE" smtClean="0"/>
-              <a:t>15/02/2020</a:t>
+              <a:t>20/05/2020</a:t>
             </a:fld>
             <a:endParaRPr lang="nl-BE"/>
           </a:p>
@@ -4025,7 +4025,7 @@
           <a:p>
             <a:fld id="{4D908FE6-92FF-41E5-B581-34241A2F11BF}" type="slidenum">
               <a:rPr lang="nl-BE" smtClean="0"/>
-              <a:t>‹#›</a:t>
+              <a:t>‹nr.›</a:t>
             </a:fld>
             <a:endParaRPr lang="nl-BE"/>
           </a:p>
@@ -4153,7 +4153,7 @@
           <a:p>
             <a:fld id="{4E928996-A761-48F5-904A-3D23874764CB}" type="datetimeFigureOut">
               <a:rPr lang="nl-BE" smtClean="0"/>
-              <a:t>15/02/2020</a:t>
+              <a:t>20/05/2020</a:t>
             </a:fld>
             <a:endParaRPr lang="nl-BE"/>
           </a:p>
@@ -4195,7 +4195,7 @@
           <a:p>
             <a:fld id="{4D908FE6-92FF-41E5-B581-34241A2F11BF}" type="slidenum">
               <a:rPr lang="nl-BE" smtClean="0"/>
-              <a:t>‹#›</a:t>
+              <a:t>‹nr.›</a:t>
             </a:fld>
             <a:endParaRPr lang="nl-BE"/>
           </a:p>
@@ -4333,7 +4333,7 @@
           <a:p>
             <a:fld id="{4E928996-A761-48F5-904A-3D23874764CB}" type="datetimeFigureOut">
               <a:rPr lang="nl-BE" smtClean="0"/>
-              <a:t>15/02/2020</a:t>
+              <a:t>20/05/2020</a:t>
             </a:fld>
             <a:endParaRPr lang="nl-BE"/>
           </a:p>
@@ -4375,7 +4375,7 @@
           <a:p>
             <a:fld id="{4D908FE6-92FF-41E5-B581-34241A2F11BF}" type="slidenum">
               <a:rPr lang="nl-BE" smtClean="0"/>
-              <a:t>‹#›</a:t>
+              <a:t>‹nr.›</a:t>
             </a:fld>
             <a:endParaRPr lang="nl-BE"/>
           </a:p>
@@ -5490,7 +5490,7 @@
                 </a:solidFill>
               </a:rPr>
               <a:pPr/>
-              <a:t>15/02/2020</a:t>
+              <a:t>20/05/2020</a:t>
             </a:fld>
             <a:endParaRPr lang="nl-BE">
               <a:solidFill>
@@ -5561,7 +5561,7 @@
                 </a:solidFill>
               </a:rPr>
               <a:pPr/>
-              <a:t>‹#›</a:t>
+              <a:t>‹nr.›</a:t>
             </a:fld>
             <a:endParaRPr lang="nl-BE">
               <a:solidFill>
@@ -5693,7 +5693,7 @@
           <a:p>
             <a:fld id="{4E928996-A761-48F5-904A-3D23874764CB}" type="datetimeFigureOut">
               <a:rPr lang="nl-BE" smtClean="0"/>
-              <a:t>15/02/2020</a:t>
+              <a:t>20/05/2020</a:t>
             </a:fld>
             <a:endParaRPr lang="nl-BE"/>
           </a:p>
@@ -5735,7 +5735,7 @@
           <a:p>
             <a:fld id="{4D908FE6-92FF-41E5-B581-34241A2F11BF}" type="slidenum">
               <a:rPr lang="nl-BE" smtClean="0"/>
-              <a:t>‹#›</a:t>
+              <a:t>‹nr.›</a:t>
             </a:fld>
             <a:endParaRPr lang="nl-BE"/>
           </a:p>
@@ -5939,7 +5939,7 @@
           <a:p>
             <a:fld id="{4E928996-A761-48F5-904A-3D23874764CB}" type="datetimeFigureOut">
               <a:rPr lang="nl-BE" smtClean="0"/>
-              <a:t>15/02/2020</a:t>
+              <a:t>20/05/2020</a:t>
             </a:fld>
             <a:endParaRPr lang="nl-BE"/>
           </a:p>
@@ -5981,7 +5981,7 @@
           <a:p>
             <a:fld id="{4D908FE6-92FF-41E5-B581-34241A2F11BF}" type="slidenum">
               <a:rPr lang="nl-BE" smtClean="0"/>
-              <a:t>‹#›</a:t>
+              <a:t>‹nr.›</a:t>
             </a:fld>
             <a:endParaRPr lang="nl-BE"/>
           </a:p>
@@ -6227,7 +6227,7 @@
           <a:p>
             <a:fld id="{4E928996-A761-48F5-904A-3D23874764CB}" type="datetimeFigureOut">
               <a:rPr lang="nl-BE" smtClean="0"/>
-              <a:t>15/02/2020</a:t>
+              <a:t>20/05/2020</a:t>
             </a:fld>
             <a:endParaRPr lang="nl-BE"/>
           </a:p>
@@ -6269,7 +6269,7 @@
           <a:p>
             <a:fld id="{4D908FE6-92FF-41E5-B581-34241A2F11BF}" type="slidenum">
               <a:rPr lang="nl-BE" smtClean="0"/>
-              <a:t>‹#›</a:t>
+              <a:t>‹nr.›</a:t>
             </a:fld>
             <a:endParaRPr lang="nl-BE"/>
           </a:p>
@@ -6649,7 +6649,7 @@
           <a:p>
             <a:fld id="{4E928996-A761-48F5-904A-3D23874764CB}" type="datetimeFigureOut">
               <a:rPr lang="nl-BE" smtClean="0"/>
-              <a:t>15/02/2020</a:t>
+              <a:t>20/05/2020</a:t>
             </a:fld>
             <a:endParaRPr lang="nl-BE"/>
           </a:p>
@@ -6691,7 +6691,7 @@
           <a:p>
             <a:fld id="{4D908FE6-92FF-41E5-B581-34241A2F11BF}" type="slidenum">
               <a:rPr lang="nl-BE" smtClean="0"/>
-              <a:t>‹#›</a:t>
+              <a:t>‹nr.›</a:t>
             </a:fld>
             <a:endParaRPr lang="nl-BE"/>
           </a:p>
@@ -6767,7 +6767,7 @@
           <a:p>
             <a:fld id="{4E928996-A761-48F5-904A-3D23874764CB}" type="datetimeFigureOut">
               <a:rPr lang="nl-BE" smtClean="0"/>
-              <a:t>15/02/2020</a:t>
+              <a:t>20/05/2020</a:t>
             </a:fld>
             <a:endParaRPr lang="nl-BE"/>
           </a:p>
@@ -6809,7 +6809,7 @@
           <a:p>
             <a:fld id="{4D908FE6-92FF-41E5-B581-34241A2F11BF}" type="slidenum">
               <a:rPr lang="nl-BE" smtClean="0"/>
-              <a:t>‹#›</a:t>
+              <a:t>‹nr.›</a:t>
             </a:fld>
             <a:endParaRPr lang="nl-BE"/>
           </a:p>
@@ -6862,7 +6862,7 @@
           <a:p>
             <a:fld id="{4E928996-A761-48F5-904A-3D23874764CB}" type="datetimeFigureOut">
               <a:rPr lang="nl-BE" smtClean="0"/>
-              <a:t>15/02/2020</a:t>
+              <a:t>20/05/2020</a:t>
             </a:fld>
             <a:endParaRPr lang="nl-BE"/>
           </a:p>
@@ -6904,7 +6904,7 @@
           <a:p>
             <a:fld id="{4D908FE6-92FF-41E5-B581-34241A2F11BF}" type="slidenum">
               <a:rPr lang="nl-BE" smtClean="0"/>
-              <a:t>‹#›</a:t>
+              <a:t>‹nr.›</a:t>
             </a:fld>
             <a:endParaRPr lang="nl-BE"/>
           </a:p>
@@ -7139,7 +7139,7 @@
           <a:p>
             <a:fld id="{4E928996-A761-48F5-904A-3D23874764CB}" type="datetimeFigureOut">
               <a:rPr lang="nl-BE" smtClean="0"/>
-              <a:t>15/02/2020</a:t>
+              <a:t>20/05/2020</a:t>
             </a:fld>
             <a:endParaRPr lang="nl-BE"/>
           </a:p>
@@ -7181,7 +7181,7 @@
           <a:p>
             <a:fld id="{4D908FE6-92FF-41E5-B581-34241A2F11BF}" type="slidenum">
               <a:rPr lang="nl-BE" smtClean="0"/>
-              <a:t>‹#›</a:t>
+              <a:t>‹nr.›</a:t>
             </a:fld>
             <a:endParaRPr lang="nl-BE"/>
           </a:p>
@@ -7392,7 +7392,7 @@
           <a:p>
             <a:fld id="{4E928996-A761-48F5-904A-3D23874764CB}" type="datetimeFigureOut">
               <a:rPr lang="nl-BE" smtClean="0"/>
-              <a:t>15/02/2020</a:t>
+              <a:t>20/05/2020</a:t>
             </a:fld>
             <a:endParaRPr lang="nl-BE"/>
           </a:p>
@@ -7434,7 +7434,7 @@
           <a:p>
             <a:fld id="{4D908FE6-92FF-41E5-B581-34241A2F11BF}" type="slidenum">
               <a:rPr lang="nl-BE" smtClean="0"/>
-              <a:t>‹#›</a:t>
+              <a:t>‹nr.›</a:t>
             </a:fld>
             <a:endParaRPr lang="nl-BE"/>
           </a:p>
@@ -7605,7 +7605,7 @@
           <a:p>
             <a:fld id="{4E928996-A761-48F5-904A-3D23874764CB}" type="datetimeFigureOut">
               <a:rPr lang="nl-BE" smtClean="0"/>
-              <a:t>15/02/2020</a:t>
+              <a:t>20/05/2020</a:t>
             </a:fld>
             <a:endParaRPr lang="nl-BE"/>
           </a:p>
@@ -7683,7 +7683,7 @@
           <a:p>
             <a:fld id="{4D908FE6-92FF-41E5-B581-34241A2F11BF}" type="slidenum">
               <a:rPr lang="nl-BE" smtClean="0"/>
-              <a:t>‹#›</a:t>
+              <a:t>‹nr.›</a:t>
             </a:fld>
             <a:endParaRPr lang="nl-BE"/>
           </a:p>
@@ -8394,17 +8394,10 @@
           <a:p>
             <a:pPr algn="ctr"/>
             <a:r>
-              <a:rPr lang="nl-BE" b="1" dirty="0"/>
+              <a:rPr lang="nl-BE" b="1"/>
               <a:t>en rendement</a:t>
             </a:r>
-          </a:p>
-          <a:p>
-            <a:pPr algn="ctr"/>
-            <a:r>
-              <a:rPr lang="nl-BE" sz="2800" dirty="0"/>
-              <a:t>2019</a:t>
-            </a:r>
-            <a:endParaRPr lang="nl-BE" dirty="0"/>
+            <a:endParaRPr lang="nl-BE" b="1" dirty="0"/>
           </a:p>
         </p:txBody>
       </p:sp>
@@ -12486,8 +12479,13 @@
             <a:pPr algn="ctr"/>
             <a:r>
               <a:rPr lang="nl-BE" sz="2400" b="1" dirty="0"/>
-              <a:t>in % van de voltijdse nieuwe studenten met een bepaalde vooropleiding, einde academiejaar ‘18-’19*</a:t>
+              <a:t>in % van de voltijdse nieuwe studenten met een bepaalde vooropleiding, </a:t>
             </a:r>
+            <a:r>
+              <a:rPr lang="nl-BE" sz="2400" b="1"/>
+              <a:t>einde academiejaar</a:t>
+            </a:r>
+            <a:endParaRPr lang="nl-BE" sz="2400" b="1" dirty="0"/>
           </a:p>
         </p:txBody>
       </p:sp>
@@ -18410,7 +18408,7 @@
         <p:spPr>
           <a:xfrm>
             <a:off x="180503" y="692696"/>
-            <a:ext cx="9002592" cy="954107"/>
+            <a:ext cx="9002592" cy="523220"/>
           </a:xfrm>
           <a:prstGeom prst="rect">
             <a:avLst/>
@@ -18426,15 +18424,13 @@
             <a:pPr algn="ctr"/>
             <a:r>
               <a:rPr lang="nl-BE" sz="2800" b="1" dirty="0"/>
-              <a:t>4.2. Studieduur per type SO, uitstroom ‘18-’19* </a:t>
+              <a:t>4.2. Studieduur per </a:t>
             </a:r>
-          </a:p>
-          <a:p>
-            <a:pPr algn="ctr"/>
             <a:r>
-              <a:rPr lang="nl-BE" sz="2800" b="1" dirty="0"/>
-              <a:t>in aantal studenten</a:t>
+              <a:rPr lang="nl-BE" sz="2800" b="1"/>
+              <a:t>type SO</a:t>
             </a:r>
+            <a:endParaRPr lang="nl-BE" sz="2800" b="1" dirty="0"/>
           </a:p>
         </p:txBody>
       </p:sp>

</xml_diff>

<commit_message>
PowerPoint Complete (Behalve Grafieken)
</commit_message>
<xml_diff>
--- a/CalculationDomain/ErasmusHogeSchool/EmptyPowerPoint.pptx
+++ b/CalculationDomain/ErasmusHogeSchool/EmptyPowerPoint.pptx
@@ -2358,7 +2358,7 @@
           <a:p>
             <a:fld id="{55ACFCA9-EE0F-409A-A8C3-56F056561412}" type="datetimeFigureOut">
               <a:rPr lang="nl-BE" smtClean="0"/>
-              <a:t>20/05/2020</a:t>
+              <a:t>27/05/2020</a:t>
             </a:fld>
             <a:endParaRPr lang="nl-BE"/>
           </a:p>
@@ -3983,7 +3983,7 @@
           <a:p>
             <a:fld id="{4E928996-A761-48F5-904A-3D23874764CB}" type="datetimeFigureOut">
               <a:rPr lang="nl-BE" smtClean="0"/>
-              <a:t>20/05/2020</a:t>
+              <a:t>27/05/2020</a:t>
             </a:fld>
             <a:endParaRPr lang="nl-BE"/>
           </a:p>
@@ -4153,7 +4153,7 @@
           <a:p>
             <a:fld id="{4E928996-A761-48F5-904A-3D23874764CB}" type="datetimeFigureOut">
               <a:rPr lang="nl-BE" smtClean="0"/>
-              <a:t>20/05/2020</a:t>
+              <a:t>27/05/2020</a:t>
             </a:fld>
             <a:endParaRPr lang="nl-BE"/>
           </a:p>
@@ -4333,7 +4333,7 @@
           <a:p>
             <a:fld id="{4E928996-A761-48F5-904A-3D23874764CB}" type="datetimeFigureOut">
               <a:rPr lang="nl-BE" smtClean="0"/>
-              <a:t>20/05/2020</a:t>
+              <a:t>27/05/2020</a:t>
             </a:fld>
             <a:endParaRPr lang="nl-BE"/>
           </a:p>
@@ -5490,7 +5490,7 @@
                 </a:solidFill>
               </a:rPr>
               <a:pPr/>
-              <a:t>20/05/2020</a:t>
+              <a:t>27/05/2020</a:t>
             </a:fld>
             <a:endParaRPr lang="nl-BE">
               <a:solidFill>
@@ -5693,7 +5693,7 @@
           <a:p>
             <a:fld id="{4E928996-A761-48F5-904A-3D23874764CB}" type="datetimeFigureOut">
               <a:rPr lang="nl-BE" smtClean="0"/>
-              <a:t>20/05/2020</a:t>
+              <a:t>27/05/2020</a:t>
             </a:fld>
             <a:endParaRPr lang="nl-BE"/>
           </a:p>
@@ -5939,7 +5939,7 @@
           <a:p>
             <a:fld id="{4E928996-A761-48F5-904A-3D23874764CB}" type="datetimeFigureOut">
               <a:rPr lang="nl-BE" smtClean="0"/>
-              <a:t>20/05/2020</a:t>
+              <a:t>27/05/2020</a:t>
             </a:fld>
             <a:endParaRPr lang="nl-BE"/>
           </a:p>
@@ -6227,7 +6227,7 @@
           <a:p>
             <a:fld id="{4E928996-A761-48F5-904A-3D23874764CB}" type="datetimeFigureOut">
               <a:rPr lang="nl-BE" smtClean="0"/>
-              <a:t>20/05/2020</a:t>
+              <a:t>27/05/2020</a:t>
             </a:fld>
             <a:endParaRPr lang="nl-BE"/>
           </a:p>
@@ -6649,7 +6649,7 @@
           <a:p>
             <a:fld id="{4E928996-A761-48F5-904A-3D23874764CB}" type="datetimeFigureOut">
               <a:rPr lang="nl-BE" smtClean="0"/>
-              <a:t>20/05/2020</a:t>
+              <a:t>27/05/2020</a:t>
             </a:fld>
             <a:endParaRPr lang="nl-BE"/>
           </a:p>
@@ -6767,7 +6767,7 @@
           <a:p>
             <a:fld id="{4E928996-A761-48F5-904A-3D23874764CB}" type="datetimeFigureOut">
               <a:rPr lang="nl-BE" smtClean="0"/>
-              <a:t>20/05/2020</a:t>
+              <a:t>27/05/2020</a:t>
             </a:fld>
             <a:endParaRPr lang="nl-BE"/>
           </a:p>
@@ -6862,7 +6862,7 @@
           <a:p>
             <a:fld id="{4E928996-A761-48F5-904A-3D23874764CB}" type="datetimeFigureOut">
               <a:rPr lang="nl-BE" smtClean="0"/>
-              <a:t>20/05/2020</a:t>
+              <a:t>27/05/2020</a:t>
             </a:fld>
             <a:endParaRPr lang="nl-BE"/>
           </a:p>
@@ -7139,7 +7139,7 @@
           <a:p>
             <a:fld id="{4E928996-A761-48F5-904A-3D23874764CB}" type="datetimeFigureOut">
               <a:rPr lang="nl-BE" smtClean="0"/>
-              <a:t>20/05/2020</a:t>
+              <a:t>27/05/2020</a:t>
             </a:fld>
             <a:endParaRPr lang="nl-BE"/>
           </a:p>
@@ -7392,7 +7392,7 @@
           <a:p>
             <a:fld id="{4E928996-A761-48F5-904A-3D23874764CB}" type="datetimeFigureOut">
               <a:rPr lang="nl-BE" smtClean="0"/>
-              <a:t>20/05/2020</a:t>
+              <a:t>27/05/2020</a:t>
             </a:fld>
             <a:endParaRPr lang="nl-BE"/>
           </a:p>
@@ -7605,7 +7605,7 @@
           <a:p>
             <a:fld id="{4E928996-A761-48F5-904A-3D23874764CB}" type="datetimeFigureOut">
               <a:rPr lang="nl-BE" smtClean="0"/>
-              <a:t>20/05/2020</a:t>
+              <a:t>27/05/2020</a:t>
             </a:fld>
             <a:endParaRPr lang="nl-BE"/>
           </a:p>
@@ -20666,7 +20666,7 @@
         <p:spPr>
           <a:xfrm>
             <a:off x="339045" y="210189"/>
-            <a:ext cx="8820472" cy="1384995"/>
+            <a:ext cx="8820472" cy="1077218"/>
           </a:xfrm>
           <a:prstGeom prst="rect">
             <a:avLst/>
@@ -20683,13 +20683,6 @@
             <a:r>
               <a:rPr lang="nl-BE" sz="3200" b="1" dirty="0"/>
               <a:t>5.1. Aantal opgenomen/verworven studiepunten en rendement</a:t>
-            </a:r>
-          </a:p>
-          <a:p>
-            <a:pPr algn="ctr"/>
-            <a:r>
-              <a:rPr lang="nl-BE" sz="2000" dirty="0"/>
-              <a:t>voor de opleiding vroedkunde</a:t>
             </a:r>
           </a:p>
         </p:txBody>
@@ -22203,7 +22196,7 @@
         <p:spPr>
           <a:xfrm>
             <a:off x="107504" y="548680"/>
-            <a:ext cx="8820472" cy="892552"/>
+            <a:ext cx="8820472" cy="584775"/>
           </a:xfrm>
           <a:prstGeom prst="rect">
             <a:avLst/>
@@ -22220,13 +22213,6 @@
             <a:r>
               <a:rPr lang="nl-BE" sz="3200" b="1" dirty="0"/>
               <a:t>5.2. Studierendement per type SO</a:t>
-            </a:r>
-          </a:p>
-          <a:p>
-            <a:pPr algn="ctr"/>
-            <a:r>
-              <a:rPr lang="nl-BE" sz="2000" dirty="0"/>
-              <a:t>voor de opleiding vroedkunde</a:t>
             </a:r>
           </a:p>
         </p:txBody>
@@ -22281,14 +22267,14 @@
           <p:nvPr>
             <p:extLst>
               <p:ext uri="{D42A27DB-BD31-4B8C-83A1-F6EECF244321}">
-                <p14:modId xmlns:p14="http://schemas.microsoft.com/office/powerpoint/2010/main" val="3582156028"/>
+                <p14:modId xmlns:p14="http://schemas.microsoft.com/office/powerpoint/2010/main" val="2854555432"/>
               </p:ext>
             </p:extLst>
           </p:nvPr>
         </p:nvGraphicFramePr>
         <p:xfrm>
           <a:off x="427116" y="1461821"/>
-          <a:ext cx="8105322" cy="1947566"/>
+          <a:ext cx="8105322" cy="1640070"/>
         </p:xfrm>
         <a:graphic>
           <a:graphicData uri="http://schemas.openxmlformats.org/drawingml/2006/table">
@@ -22338,8 +22324,8 @@
                   </a:extLst>
                 </a:gridCol>
               </a:tblGrid>
-              <a:tr h="286481">
-                <a:tc rowSpan="2">
+              <a:tr h="455011">
+                <a:tc>
                   <a:txBody>
                     <a:bodyPr/>
                     <a:lstStyle/>
@@ -22439,28 +22425,7 @@
                       <a:headEnd type="none" w="med" len="med"/>
                       <a:tailEnd type="none" w="med" len="med"/>
                     </a:lnT>
-                    <a:lnB>
-                      <a:noFill/>
-                    </a:lnB>
-                  </a:tcPr>
-                </a:tc>
-                <a:tc>
-                  <a:txBody>
-                    <a:bodyPr/>
-                    <a:lstStyle/>
-                    <a:p>
-                      <a:pPr algn="ctr" rtl="0" fontAlgn="b"/>
-                      <a:endParaRPr lang="nl-BE" sz="1600" b="1" i="0" u="none" strike="noStrike" dirty="0">
-                        <a:solidFill>
-                          <a:srgbClr val="000000"/>
-                        </a:solidFill>
-                        <a:effectLst/>
-                        <a:latin typeface="Calibri" panose="020F0502020204030204" pitchFamily="34" charset="0"/>
-                      </a:endParaRPr>
-                    </a:p>
-                  </a:txBody>
-                  <a:tcPr marL="9525" marR="9525" marT="9525" marB="0" anchor="b">
-                    <a:lnL w="12700" cap="flat" cmpd="sng" algn="ctr">
+                    <a:lnB w="12700" cap="flat" cmpd="sng" algn="ctr">
                       <a:solidFill>
                         <a:srgbClr val="000000"/>
                       </a:solidFill>
@@ -22468,79 +22433,10 @@
                       <a:round/>
                       <a:headEnd type="none" w="med" len="med"/>
                       <a:tailEnd type="none" w="med" len="med"/>
-                    </a:lnL>
-                    <a:lnR w="12700" cap="flat" cmpd="sng" algn="ctr">
-                      <a:solidFill>
-                        <a:srgbClr val="000000"/>
-                      </a:solidFill>
-                      <a:prstDash val="solid"/>
-                      <a:round/>
-                      <a:headEnd type="none" w="med" len="med"/>
-                      <a:tailEnd type="none" w="med" len="med"/>
-                    </a:lnR>
-                    <a:lnT w="12700" cap="flat" cmpd="sng" algn="ctr">
-                      <a:solidFill>
-                        <a:srgbClr val="000000"/>
-                      </a:solidFill>
-                      <a:prstDash val="solid"/>
-                      <a:round/>
-                      <a:headEnd type="none" w="med" len="med"/>
-                      <a:tailEnd type="none" w="med" len="med"/>
-                    </a:lnT>
-                    <a:lnB>
-                      <a:noFill/>
                     </a:lnB>
                   </a:tcPr>
                 </a:tc>
                 <a:tc>
-                  <a:txBody>
-                    <a:bodyPr/>
-                    <a:lstStyle/>
-                    <a:p>
-                      <a:pPr algn="ctr" rtl="0" fontAlgn="b"/>
-                      <a:endParaRPr lang="nl-BE" sz="1600" b="1" i="0" u="none" strike="noStrike" dirty="0">
-                        <a:solidFill>
-                          <a:srgbClr val="000000"/>
-                        </a:solidFill>
-                        <a:effectLst/>
-                        <a:latin typeface="Calibri" panose="020F0502020204030204" pitchFamily="34" charset="0"/>
-                      </a:endParaRPr>
-                    </a:p>
-                  </a:txBody>
-                  <a:tcPr marL="9525" marR="9525" marT="9525" marB="0" anchor="b">
-                    <a:lnL w="12700" cap="flat" cmpd="sng" algn="ctr">
-                      <a:solidFill>
-                        <a:srgbClr val="000000"/>
-                      </a:solidFill>
-                      <a:prstDash val="solid"/>
-                      <a:round/>
-                      <a:headEnd type="none" w="med" len="med"/>
-                      <a:tailEnd type="none" w="med" len="med"/>
-                    </a:lnL>
-                    <a:lnR w="12700" cap="flat" cmpd="sng" algn="ctr">
-                      <a:solidFill>
-                        <a:srgbClr val="000000"/>
-                      </a:solidFill>
-                      <a:prstDash val="solid"/>
-                      <a:round/>
-                      <a:headEnd type="none" w="med" len="med"/>
-                      <a:tailEnd type="none" w="med" len="med"/>
-                    </a:lnR>
-                    <a:lnT w="12700" cap="flat" cmpd="sng" algn="ctr">
-                      <a:solidFill>
-                        <a:srgbClr val="000000"/>
-                      </a:solidFill>
-                      <a:prstDash val="solid"/>
-                      <a:round/>
-                      <a:headEnd type="none" w="med" len="med"/>
-                      <a:tailEnd type="none" w="med" len="med"/>
-                    </a:lnT>
-                    <a:lnB>
-                      <a:noFill/>
-                    </a:lnB>
-                  </a:tcPr>
-                </a:tc>
-                <a:tc rowSpan="2">
                   <a:txBody>
                     <a:bodyPr/>
                     <a:lstStyle/>
@@ -22594,7 +22490,7 @@
                     </a:lnB>
                   </a:tcPr>
                 </a:tc>
-                <a:tc rowSpan="2">
+                <a:tc>
                   <a:txBody>
                     <a:bodyPr/>
                     <a:lstStyle/>
@@ -22602,7 +22498,7 @@
                       <a:pPr algn="ctr" rtl="0" fontAlgn="b"/>
                       <a:endParaRPr lang="nl-BE" sz="1600" b="1" i="0" u="none" strike="noStrike" dirty="0">
                         <a:solidFill>
-                          <a:srgbClr val="0070C0"/>
+                          <a:srgbClr val="000000"/>
                         </a:solidFill>
                         <a:effectLst/>
                         <a:latin typeface="Calibri" panose="020F0502020204030204" pitchFamily="34" charset="0"/>
@@ -22648,23 +22544,6 @@
                     </a:lnB>
                   </a:tcPr>
                 </a:tc>
-                <a:extLst>
-                  <a:ext uri="{0D108BD9-81ED-4DB2-BD59-A6C34878D82A}">
-                    <a16:rowId xmlns:a16="http://schemas.microsoft.com/office/drawing/2014/main" val="2905016363"/>
-                  </a:ext>
-                </a:extLst>
-              </a:tr>
-              <a:tr h="168530">
-                <a:tc vMerge="1">
-                  <a:txBody>
-                    <a:bodyPr/>
-                    <a:lstStyle/>
-                    <a:p>
-                      <a:endParaRPr lang="nl-BE"/>
-                    </a:p>
-                  </a:txBody>
-                  <a:tcPr/>
-                </a:tc>
                 <a:tc>
                   <a:txBody>
                     <a:bodyPr/>
@@ -22678,180 +22557,6 @@
                         <a:effectLst/>
                         <a:latin typeface="Calibri" panose="020F0502020204030204" pitchFamily="34" charset="0"/>
                       </a:endParaRPr>
-                    </a:p>
-                  </a:txBody>
-                  <a:tcPr marL="9525" marR="9525" marT="9525" marB="0" anchor="b">
-                    <a:lnL w="12700" cap="flat" cmpd="sng" algn="ctr">
-                      <a:solidFill>
-                        <a:srgbClr val="000000"/>
-                      </a:solidFill>
-                      <a:prstDash val="solid"/>
-                      <a:round/>
-                      <a:headEnd type="none" w="med" len="med"/>
-                      <a:tailEnd type="none" w="med" len="med"/>
-                    </a:lnL>
-                    <a:lnR w="12700" cap="flat" cmpd="sng" algn="ctr">
-                      <a:solidFill>
-                        <a:srgbClr val="000000"/>
-                      </a:solidFill>
-                      <a:prstDash val="solid"/>
-                      <a:round/>
-                      <a:headEnd type="none" w="med" len="med"/>
-                      <a:tailEnd type="none" w="med" len="med"/>
-                    </a:lnR>
-                    <a:lnT>
-                      <a:noFill/>
-                    </a:lnT>
-                    <a:lnB w="12700" cap="flat" cmpd="sng" algn="ctr">
-                      <a:solidFill>
-                        <a:srgbClr val="000000"/>
-                      </a:solidFill>
-                      <a:prstDash val="solid"/>
-                      <a:round/>
-                      <a:headEnd type="none" w="med" len="med"/>
-                      <a:tailEnd type="none" w="med" len="med"/>
-                    </a:lnB>
-                  </a:tcPr>
-                </a:tc>
-                <a:tc>
-                  <a:txBody>
-                    <a:bodyPr/>
-                    <a:lstStyle/>
-                    <a:p>
-                      <a:pPr algn="ctr" rtl="0" fontAlgn="b"/>
-                      <a:endParaRPr lang="nl-BE" sz="1600" b="1" i="0" u="none" strike="noStrike" dirty="0">
-                        <a:solidFill>
-                          <a:srgbClr val="000000"/>
-                        </a:solidFill>
-                        <a:effectLst/>
-                        <a:latin typeface="Calibri" panose="020F0502020204030204" pitchFamily="34" charset="0"/>
-                      </a:endParaRPr>
-                    </a:p>
-                  </a:txBody>
-                  <a:tcPr marL="9525" marR="9525" marT="9525" marB="0" anchor="b">
-                    <a:lnL w="12700" cap="flat" cmpd="sng" algn="ctr">
-                      <a:solidFill>
-                        <a:srgbClr val="000000"/>
-                      </a:solidFill>
-                      <a:prstDash val="solid"/>
-                      <a:round/>
-                      <a:headEnd type="none" w="med" len="med"/>
-                      <a:tailEnd type="none" w="med" len="med"/>
-                    </a:lnL>
-                    <a:lnR w="12700" cap="flat" cmpd="sng" algn="ctr">
-                      <a:solidFill>
-                        <a:srgbClr val="000000"/>
-                      </a:solidFill>
-                      <a:prstDash val="solid"/>
-                      <a:round/>
-                      <a:headEnd type="none" w="med" len="med"/>
-                      <a:tailEnd type="none" w="med" len="med"/>
-                    </a:lnR>
-                    <a:lnT>
-                      <a:noFill/>
-                    </a:lnT>
-                    <a:lnB w="12700" cap="flat" cmpd="sng" algn="ctr">
-                      <a:solidFill>
-                        <a:srgbClr val="000000"/>
-                      </a:solidFill>
-                      <a:prstDash val="solid"/>
-                      <a:round/>
-                      <a:headEnd type="none" w="med" len="med"/>
-                      <a:tailEnd type="none" w="med" len="med"/>
-                    </a:lnB>
-                  </a:tcPr>
-                </a:tc>
-                <a:tc>
-                  <a:txBody>
-                    <a:bodyPr/>
-                    <a:lstStyle/>
-                    <a:p>
-                      <a:pPr algn="ctr" rtl="0" fontAlgn="b"/>
-                      <a:endParaRPr lang="nl-BE" sz="1600" b="1" i="0" u="none" strike="noStrike" dirty="0">
-                        <a:solidFill>
-                          <a:srgbClr val="000000"/>
-                        </a:solidFill>
-                        <a:effectLst/>
-                        <a:latin typeface="Calibri" panose="020F0502020204030204" pitchFamily="34" charset="0"/>
-                      </a:endParaRPr>
-                    </a:p>
-                  </a:txBody>
-                  <a:tcPr marL="9525" marR="9525" marT="9525" marB="0" anchor="b">
-                    <a:lnL w="12700" cap="flat" cmpd="sng" algn="ctr">
-                      <a:solidFill>
-                        <a:srgbClr val="000000"/>
-                      </a:solidFill>
-                      <a:prstDash val="solid"/>
-                      <a:round/>
-                      <a:headEnd type="none" w="med" len="med"/>
-                      <a:tailEnd type="none" w="med" len="med"/>
-                    </a:lnL>
-                    <a:lnR w="12700" cap="flat" cmpd="sng" algn="ctr">
-                      <a:solidFill>
-                        <a:srgbClr val="000000"/>
-                      </a:solidFill>
-                      <a:prstDash val="solid"/>
-                      <a:round/>
-                      <a:headEnd type="none" w="med" len="med"/>
-                      <a:tailEnd type="none" w="med" len="med"/>
-                    </a:lnR>
-                    <a:lnT>
-                      <a:noFill/>
-                    </a:lnT>
-                    <a:lnB w="12700" cap="flat" cmpd="sng" algn="ctr">
-                      <a:solidFill>
-                        <a:srgbClr val="000000"/>
-                      </a:solidFill>
-                      <a:prstDash val="solid"/>
-                      <a:round/>
-                      <a:headEnd type="none" w="med" len="med"/>
-                      <a:tailEnd type="none" w="med" len="med"/>
-                    </a:lnB>
-                  </a:tcPr>
-                </a:tc>
-                <a:tc vMerge="1">
-                  <a:txBody>
-                    <a:bodyPr/>
-                    <a:lstStyle/>
-                    <a:p>
-                      <a:endParaRPr lang="nl-BE"/>
-                    </a:p>
-                  </a:txBody>
-                  <a:tcPr/>
-                </a:tc>
-                <a:tc vMerge="1">
-                  <a:txBody>
-                    <a:bodyPr/>
-                    <a:lstStyle/>
-                    <a:p>
-                      <a:endParaRPr lang="nl-BE"/>
-                    </a:p>
-                  </a:txBody>
-                  <a:tcPr/>
-                </a:tc>
-                <a:extLst>
-                  <a:ext uri="{0D108BD9-81ED-4DB2-BD59-A6C34878D82A}">
-                    <a16:rowId xmlns:a16="http://schemas.microsoft.com/office/drawing/2014/main" val="1355346419"/>
-                  </a:ext>
-                </a:extLst>
-              </a:tr>
-              <a:tr h="193452">
-                <a:tc>
-                  <a:txBody>
-                    <a:bodyPr/>
-                    <a:lstStyle/>
-                    <a:p>
-                      <a:pPr algn="ctr" rtl="0" fontAlgn="b"/>
-                      <a:r>
-                        <a:rPr lang="nl-BE" sz="1600" b="1" i="0" u="none" strike="noStrike">
-                          <a:solidFill>
-                            <a:srgbClr val="000000"/>
-                          </a:solidFill>
-                          <a:effectLst/>
-                          <a:latin typeface="Calibri" panose="020F0502020204030204" pitchFamily="34" charset="0"/>
-                        </a:rPr>
-                        <a:t>ASO</a:t>
-                      </a:r>
                     </a:p>
                   </a:txBody>
                   <a:tcPr marL="9525" marR="9525" marT="9525" marB="0" anchor="b">
@@ -22899,12 +22604,12 @@
                     <a:lstStyle/>
                     <a:p>
                       <a:pPr algn="ctr" rtl="0" fontAlgn="b"/>
-                      <a:endParaRPr lang="nl-BE" sz="1600" b="0" i="0" u="none" strike="noStrike" dirty="0">
-                        <a:solidFill>
-                          <a:srgbClr val="000000"/>
+                      <a:endParaRPr lang="nl-BE" sz="1600" b="1" i="0" u="none" strike="noStrike" dirty="0">
+                        <a:solidFill>
+                          <a:srgbClr val="0070C0"/>
                         </a:solidFill>
                         <a:effectLst/>
-                        <a:latin typeface="Tahoma" panose="020B0604030504040204" pitchFamily="34" charset="0"/>
+                        <a:latin typeface="Calibri" panose="020F0502020204030204" pitchFamily="34" charset="0"/>
                       </a:endParaRPr>
                     </a:p>
                   </a:txBody>
@@ -22947,19 +22652,29 @@
                     </a:lnB>
                   </a:tcPr>
                 </a:tc>
+                <a:extLst>
+                  <a:ext uri="{0D108BD9-81ED-4DB2-BD59-A6C34878D82A}">
+                    <a16:rowId xmlns:a16="http://schemas.microsoft.com/office/drawing/2014/main" val="2905016363"/>
+                  </a:ext>
+                </a:extLst>
+              </a:tr>
+              <a:tr h="193452">
                 <a:tc>
                   <a:txBody>
                     <a:bodyPr/>
                     <a:lstStyle/>
                     <a:p>
                       <a:pPr algn="ctr" rtl="0" fontAlgn="b"/>
-                      <a:endParaRPr lang="nl-BE" sz="1600" b="0" i="0" u="none" strike="noStrike" dirty="0">
-                        <a:solidFill>
-                          <a:srgbClr val="000000"/>
-                        </a:solidFill>
-                        <a:effectLst/>
-                        <a:latin typeface="Tahoma" panose="020B0604030504040204" pitchFamily="34" charset="0"/>
-                      </a:endParaRPr>
+                      <a:r>
+                        <a:rPr lang="nl-BE" sz="1600" b="1" i="0" u="none" strike="noStrike">
+                          <a:solidFill>
+                            <a:srgbClr val="000000"/>
+                          </a:solidFill>
+                          <a:effectLst/>
+                          <a:latin typeface="Calibri" panose="020F0502020204030204" pitchFamily="34" charset="0"/>
+                        </a:rPr>
+                        <a:t>ASO</a:t>
+                      </a:r>
                     </a:p>
                   </a:txBody>
                   <a:tcPr marL="9525" marR="9525" marT="9525" marB="0" anchor="b">
@@ -23117,7 +22832,7 @@
                       <a:pPr algn="ctr" rtl="0" fontAlgn="b"/>
                       <a:endParaRPr lang="nl-BE" sz="1600" b="0" i="0" u="none" strike="noStrike" dirty="0">
                         <a:solidFill>
-                          <a:srgbClr val="4F81BD"/>
+                          <a:srgbClr val="000000"/>
                         </a:solidFill>
                         <a:effectLst/>
                         <a:latin typeface="Tahoma" panose="020B0604030504040204" pitchFamily="34" charset="0"/>
@@ -23163,29 +22878,19 @@
                     </a:lnB>
                   </a:tcPr>
                 </a:tc>
-                <a:extLst>
-                  <a:ext uri="{0D108BD9-81ED-4DB2-BD59-A6C34878D82A}">
-                    <a16:rowId xmlns:a16="http://schemas.microsoft.com/office/drawing/2014/main" val="3500620213"/>
-                  </a:ext>
-                </a:extLst>
-              </a:tr>
-              <a:tr h="427923">
                 <a:tc>
                   <a:txBody>
                     <a:bodyPr/>
                     <a:lstStyle/>
                     <a:p>
                       <a:pPr algn="ctr" rtl="0" fontAlgn="b"/>
-                      <a:r>
-                        <a:rPr lang="nl-BE" sz="1600" b="1" i="0" u="none" strike="noStrike">
-                          <a:solidFill>
-                            <a:srgbClr val="000000"/>
-                          </a:solidFill>
-                          <a:effectLst/>
-                          <a:latin typeface="Calibri" panose="020F0502020204030204" pitchFamily="34" charset="0"/>
-                        </a:rPr>
-                        <a:t>TSO</a:t>
-                      </a:r>
+                      <a:endParaRPr lang="nl-BE" sz="1600" b="0" i="0" u="none" strike="noStrike" dirty="0">
+                        <a:solidFill>
+                          <a:srgbClr val="000000"/>
+                        </a:solidFill>
+                        <a:effectLst/>
+                        <a:latin typeface="Tahoma" panose="020B0604030504040204" pitchFamily="34" charset="0"/>
+                      </a:endParaRPr>
                     </a:p>
                   </a:txBody>
                   <a:tcPr marL="9525" marR="9525" marT="9525" marB="0" anchor="b">
@@ -23235,7 +22940,7 @@
                       <a:pPr algn="ctr" rtl="0" fontAlgn="b"/>
                       <a:endParaRPr lang="nl-BE" sz="1600" b="0" i="0" u="none" strike="noStrike" dirty="0">
                         <a:solidFill>
-                          <a:srgbClr val="000000"/>
+                          <a:srgbClr val="4F81BD"/>
                         </a:solidFill>
                         <a:effectLst/>
                         <a:latin typeface="Tahoma" panose="020B0604030504040204" pitchFamily="34" charset="0"/>
@@ -23281,19 +22986,29 @@
                     </a:lnB>
                   </a:tcPr>
                 </a:tc>
+                <a:extLst>
+                  <a:ext uri="{0D108BD9-81ED-4DB2-BD59-A6C34878D82A}">
+                    <a16:rowId xmlns:a16="http://schemas.microsoft.com/office/drawing/2014/main" val="3500620213"/>
+                  </a:ext>
+                </a:extLst>
+              </a:tr>
+              <a:tr h="309872">
                 <a:tc>
                   <a:txBody>
                     <a:bodyPr/>
                     <a:lstStyle/>
                     <a:p>
                       <a:pPr algn="ctr" rtl="0" fontAlgn="b"/>
-                      <a:endParaRPr lang="nl-BE" sz="1600" b="0" i="0" u="none" strike="noStrike" dirty="0">
-                        <a:solidFill>
-                          <a:srgbClr val="000000"/>
-                        </a:solidFill>
-                        <a:effectLst/>
-                        <a:latin typeface="Tahoma" panose="020B0604030504040204" pitchFamily="34" charset="0"/>
-                      </a:endParaRPr>
+                      <a:r>
+                        <a:rPr lang="nl-BE" sz="1600" b="1" i="0" u="none" strike="noStrike">
+                          <a:solidFill>
+                            <a:srgbClr val="000000"/>
+                          </a:solidFill>
+                          <a:effectLst/>
+                          <a:latin typeface="Calibri" panose="020F0502020204030204" pitchFamily="34" charset="0"/>
+                        </a:rPr>
+                        <a:t>TSO</a:t>
+                      </a:r>
                     </a:p>
                   </a:txBody>
                   <a:tcPr marL="9525" marR="9525" marT="9525" marB="0" anchor="b">
@@ -23451,7 +23166,7 @@
                       <a:pPr algn="ctr" rtl="0" fontAlgn="b"/>
                       <a:endParaRPr lang="nl-BE" sz="1600" b="0" i="0" u="none" strike="noStrike" dirty="0">
                         <a:solidFill>
-                          <a:srgbClr val="4F81BD"/>
+                          <a:srgbClr val="000000"/>
                         </a:solidFill>
                         <a:effectLst/>
                         <a:latin typeface="Tahoma" panose="020B0604030504040204" pitchFamily="34" charset="0"/>
@@ -23497,13 +23212,121 @@
                     </a:lnB>
                   </a:tcPr>
                 </a:tc>
+                <a:tc>
+                  <a:txBody>
+                    <a:bodyPr/>
+                    <a:lstStyle/>
+                    <a:p>
+                      <a:pPr algn="ctr" rtl="0" fontAlgn="b"/>
+                      <a:endParaRPr lang="nl-BE" sz="1600" b="0" i="0" u="none" strike="noStrike" dirty="0">
+                        <a:solidFill>
+                          <a:srgbClr val="000000"/>
+                        </a:solidFill>
+                        <a:effectLst/>
+                        <a:latin typeface="Tahoma" panose="020B0604030504040204" pitchFamily="34" charset="0"/>
+                      </a:endParaRPr>
+                    </a:p>
+                  </a:txBody>
+                  <a:tcPr marL="9525" marR="9525" marT="9525" marB="0" anchor="b">
+                    <a:lnL w="12700" cap="flat" cmpd="sng" algn="ctr">
+                      <a:solidFill>
+                        <a:srgbClr val="000000"/>
+                      </a:solidFill>
+                      <a:prstDash val="solid"/>
+                      <a:round/>
+                      <a:headEnd type="none" w="med" len="med"/>
+                      <a:tailEnd type="none" w="med" len="med"/>
+                    </a:lnL>
+                    <a:lnR w="12700" cap="flat" cmpd="sng" algn="ctr">
+                      <a:solidFill>
+                        <a:srgbClr val="000000"/>
+                      </a:solidFill>
+                      <a:prstDash val="solid"/>
+                      <a:round/>
+                      <a:headEnd type="none" w="med" len="med"/>
+                      <a:tailEnd type="none" w="med" len="med"/>
+                    </a:lnR>
+                    <a:lnT w="12700" cap="flat" cmpd="sng" algn="ctr">
+                      <a:solidFill>
+                        <a:srgbClr val="000000"/>
+                      </a:solidFill>
+                      <a:prstDash val="solid"/>
+                      <a:round/>
+                      <a:headEnd type="none" w="med" len="med"/>
+                      <a:tailEnd type="none" w="med" len="med"/>
+                    </a:lnT>
+                    <a:lnB w="12700" cap="flat" cmpd="sng" algn="ctr">
+                      <a:solidFill>
+                        <a:srgbClr val="000000"/>
+                      </a:solidFill>
+                      <a:prstDash val="solid"/>
+                      <a:round/>
+                      <a:headEnd type="none" w="med" len="med"/>
+                      <a:tailEnd type="none" w="med" len="med"/>
+                    </a:lnB>
+                  </a:tcPr>
+                </a:tc>
+                <a:tc>
+                  <a:txBody>
+                    <a:bodyPr/>
+                    <a:lstStyle/>
+                    <a:p>
+                      <a:pPr algn="ctr" rtl="0" fontAlgn="b"/>
+                      <a:endParaRPr lang="nl-BE" sz="1600" b="0" i="0" u="none" strike="noStrike" dirty="0">
+                        <a:solidFill>
+                          <a:srgbClr val="4F81BD"/>
+                        </a:solidFill>
+                        <a:effectLst/>
+                        <a:latin typeface="Tahoma" panose="020B0604030504040204" pitchFamily="34" charset="0"/>
+                      </a:endParaRPr>
+                    </a:p>
+                  </a:txBody>
+                  <a:tcPr marL="9525" marR="9525" marT="9525" marB="0" anchor="b">
+                    <a:lnL w="12700" cap="flat" cmpd="sng" algn="ctr">
+                      <a:solidFill>
+                        <a:srgbClr val="000000"/>
+                      </a:solidFill>
+                      <a:prstDash val="solid"/>
+                      <a:round/>
+                      <a:headEnd type="none" w="med" len="med"/>
+                      <a:tailEnd type="none" w="med" len="med"/>
+                    </a:lnL>
+                    <a:lnR w="12700" cap="flat" cmpd="sng" algn="ctr">
+                      <a:solidFill>
+                        <a:srgbClr val="000000"/>
+                      </a:solidFill>
+                      <a:prstDash val="solid"/>
+                      <a:round/>
+                      <a:headEnd type="none" w="med" len="med"/>
+                      <a:tailEnd type="none" w="med" len="med"/>
+                    </a:lnR>
+                    <a:lnT w="12700" cap="flat" cmpd="sng" algn="ctr">
+                      <a:solidFill>
+                        <a:srgbClr val="000000"/>
+                      </a:solidFill>
+                      <a:prstDash val="solid"/>
+                      <a:round/>
+                      <a:headEnd type="none" w="med" len="med"/>
+                      <a:tailEnd type="none" w="med" len="med"/>
+                    </a:lnT>
+                    <a:lnB w="12700" cap="flat" cmpd="sng" algn="ctr">
+                      <a:solidFill>
+                        <a:srgbClr val="000000"/>
+                      </a:solidFill>
+                      <a:prstDash val="solid"/>
+                      <a:round/>
+                      <a:headEnd type="none" w="med" len="med"/>
+                      <a:tailEnd type="none" w="med" len="med"/>
+                    </a:lnB>
+                  </a:tcPr>
+                </a:tc>
                 <a:extLst>
                   <a:ext uri="{0D108BD9-81ED-4DB2-BD59-A6C34878D82A}">
                     <a16:rowId xmlns:a16="http://schemas.microsoft.com/office/drawing/2014/main" val="534592105"/>
                   </a:ext>
                 </a:extLst>
               </a:tr>
-              <a:tr h="434836">
+              <a:tr h="288032">
                 <a:tc>
                   <a:txBody>
                     <a:bodyPr/>

</xml_diff>